<commit_message>
Updates to the Project Powerpoint
Revisions to the project 1 powerpoint
file for making the main slides more concise.
</commit_message>
<xml_diff>
--- a/Project1-Presentation-Ben-Keeper.pptx
+++ b/Project1-Presentation-Ben-Keeper.pptx
@@ -269,11 +269,11 @@
           <c:showBubbleSize val="0"/>
         </c:dLbls>
         <c:gapWidth val="150"/>
-        <c:axId val="191542400"/>
-        <c:axId val="191544320"/>
+        <c:axId val="123454976"/>
+        <c:axId val="123456896"/>
       </c:barChart>
       <c:catAx>
-        <c:axId val="191542400"/>
+        <c:axId val="123454976"/>
         <c:scaling>
           <c:orientation val="minMax"/>
         </c:scaling>
@@ -306,7 +306,7 @@
         <c:majorTickMark val="out"/>
         <c:minorTickMark val="none"/>
         <c:tickLblPos val="nextTo"/>
-        <c:crossAx val="191544320"/>
+        <c:crossAx val="123456896"/>
         <c:crosses val="autoZero"/>
         <c:auto val="1"/>
         <c:lblAlgn val="ctr"/>
@@ -314,7 +314,7 @@
         <c:noMultiLvlLbl val="0"/>
       </c:catAx>
       <c:valAx>
-        <c:axId val="191544320"/>
+        <c:axId val="123456896"/>
         <c:scaling>
           <c:orientation val="minMax"/>
         </c:scaling>
@@ -348,7 +348,7 @@
         <c:majorTickMark val="out"/>
         <c:minorTickMark val="none"/>
         <c:tickLblPos val="nextTo"/>
-        <c:crossAx val="191542400"/>
+        <c:crossAx val="123454976"/>
         <c:crosses val="autoZero"/>
         <c:crossBetween val="between"/>
       </c:valAx>
@@ -394,14 +394,18 @@
               <a:defRPr/>
             </a:pPr>
             <a:r>
-              <a:rPr lang="en-US" sz="1800"/>
+              <a:rPr lang="en-US" sz="1800" dirty="0"/>
               <a:t>Contributions</a:t>
             </a:r>
             <a:r>
-              <a:rPr lang="en-US" sz="1800" baseline="0"/>
-              <a:t> by Each Region to the List of Countries with &lt;30% Female Gross Graduation Ratio</a:t>
-            </a:r>
-            <a:endParaRPr lang="en-US" sz="1800"/>
+              <a:rPr lang="en-US" sz="1800" baseline="0" dirty="0"/>
+              <a:t> by Each Region to the List of Countries with &lt;30% Female Gross Graduation </a:t>
+            </a:r>
+            <a:r>
+              <a:rPr lang="en-US" sz="1800" baseline="0" dirty="0" smtClean="0"/>
+              <a:t>Ratio (Tertiary Education)</a:t>
+            </a:r>
+            <a:endParaRPr lang="en-US" sz="1800" dirty="0"/>
           </a:p>
         </c:rich>
       </c:tx>
@@ -760,11 +764,11 @@
           <c:showBubbleSize val="0"/>
         </c:dLbls>
         <c:gapWidth val="150"/>
-        <c:axId val="135881472"/>
-        <c:axId val="135883392"/>
+        <c:axId val="143116544"/>
+        <c:axId val="143126912"/>
       </c:barChart>
       <c:catAx>
-        <c:axId val="135881472"/>
+        <c:axId val="143116544"/>
         <c:scaling>
           <c:orientation val="minMax"/>
         </c:scaling>
@@ -797,7 +801,7 @@
         <c:majorTickMark val="out"/>
         <c:minorTickMark val="none"/>
         <c:tickLblPos val="nextTo"/>
-        <c:crossAx val="135883392"/>
+        <c:crossAx val="143126912"/>
         <c:crosses val="autoZero"/>
         <c:auto val="1"/>
         <c:lblAlgn val="ctr"/>
@@ -805,7 +809,7 @@
         <c:noMultiLvlLbl val="0"/>
       </c:catAx>
       <c:valAx>
-        <c:axId val="135883392"/>
+        <c:axId val="143126912"/>
         <c:scaling>
           <c:orientation val="minMax"/>
           <c:max val="100"/>
@@ -847,7 +851,7 @@
         <c:majorTickMark val="out"/>
         <c:minorTickMark val="none"/>
         <c:tickLblPos val="nextTo"/>
-        <c:crossAx val="135881472"/>
+        <c:crossAx val="143116544"/>
         <c:crosses val="autoZero"/>
         <c:crossBetween val="between"/>
         <c:majorUnit val="5"/>
@@ -1093,11 +1097,11 @@
           <c:showBubbleSize val="0"/>
         </c:dLbls>
         <c:gapWidth val="150"/>
-        <c:axId val="191380864"/>
-        <c:axId val="191518208"/>
+        <c:axId val="123318272"/>
+        <c:axId val="123320192"/>
       </c:barChart>
       <c:catAx>
-        <c:axId val="191380864"/>
+        <c:axId val="123318272"/>
         <c:scaling>
           <c:orientation val="minMax"/>
         </c:scaling>
@@ -1130,7 +1134,7 @@
         <c:majorTickMark val="out"/>
         <c:minorTickMark val="none"/>
         <c:tickLblPos val="nextTo"/>
-        <c:crossAx val="191518208"/>
+        <c:crossAx val="123320192"/>
         <c:crosses val="autoZero"/>
         <c:auto val="1"/>
         <c:lblAlgn val="ctr"/>
@@ -1138,7 +1142,7 @@
         <c:noMultiLvlLbl val="0"/>
       </c:catAx>
       <c:valAx>
-        <c:axId val="191518208"/>
+        <c:axId val="123320192"/>
         <c:scaling>
           <c:orientation val="minMax"/>
           <c:max val="100"/>
@@ -1180,7 +1184,7 @@
         <c:majorTickMark val="out"/>
         <c:minorTickMark val="none"/>
         <c:tickLblPos val="nextTo"/>
-        <c:crossAx val="191380864"/>
+        <c:crossAx val="123318272"/>
         <c:crosses val="autoZero"/>
         <c:crossBetween val="between"/>
         <c:majorUnit val="5"/>
@@ -1613,7 +1617,7 @@
           <a:p>
             <a:fld id="{D2CD97BC-9879-4DE5-8C3D-3C0468F9F86C}" type="datetimeFigureOut">
               <a:rPr lang="en-US" smtClean="0"/>
-              <a:t>1/22/2019</a:t>
+              <a:t>1/23/2019</a:t>
             </a:fld>
             <a:endParaRPr lang="en-US"/>
           </a:p>
@@ -2044,11 +2048,11 @@
             </a:r>
             <a:r>
               <a:rPr lang="en-US" dirty="0" smtClean="0"/>
-              <a:t>“Project-1-Post-Processing-of-Hadoop Results.xlsx”;</a:t>
-            </a:r>
-            <a:r>
-              <a:rPr lang="en-US" baseline="0" dirty="0" smtClean="0"/>
-              <a:t>  The U.S. </a:t>
+              <a:t>“Project-1-Post-Processing-of-Hadoop Results.xlsx</a:t>
+            </a:r>
+            <a:r>
+              <a:rPr lang="en-US" dirty="0" smtClean="0"/>
+              <a:t>”</a:t>
             </a:r>
             <a:endParaRPr lang="en-US" dirty="0"/>
           </a:p>
@@ -2380,7 +2384,7 @@
           <a:p>
             <a:fld id="{4F16EEC3-5546-47BF-AA5B-42CBAFF1D1AF}" type="datetimeFigureOut">
               <a:rPr lang="en-US" smtClean="0"/>
-              <a:t>1/22/2019</a:t>
+              <a:t>1/23/2019</a:t>
             </a:fld>
             <a:endParaRPr lang="en-US"/>
           </a:p>
@@ -2550,7 +2554,7 @@
           <a:p>
             <a:fld id="{4F16EEC3-5546-47BF-AA5B-42CBAFF1D1AF}" type="datetimeFigureOut">
               <a:rPr lang="en-US" smtClean="0"/>
-              <a:t>1/22/2019</a:t>
+              <a:t>1/23/2019</a:t>
             </a:fld>
             <a:endParaRPr lang="en-US"/>
           </a:p>
@@ -2730,7 +2734,7 @@
           <a:p>
             <a:fld id="{4F16EEC3-5546-47BF-AA5B-42CBAFF1D1AF}" type="datetimeFigureOut">
               <a:rPr lang="en-US" smtClean="0"/>
-              <a:t>1/22/2019</a:t>
+              <a:t>1/23/2019</a:t>
             </a:fld>
             <a:endParaRPr lang="en-US"/>
           </a:p>
@@ -2900,7 +2904,7 @@
           <a:p>
             <a:fld id="{4F16EEC3-5546-47BF-AA5B-42CBAFF1D1AF}" type="datetimeFigureOut">
               <a:rPr lang="en-US" smtClean="0"/>
-              <a:t>1/22/2019</a:t>
+              <a:t>1/23/2019</a:t>
             </a:fld>
             <a:endParaRPr lang="en-US"/>
           </a:p>
@@ -3146,7 +3150,7 @@
           <a:p>
             <a:fld id="{4F16EEC3-5546-47BF-AA5B-42CBAFF1D1AF}" type="datetimeFigureOut">
               <a:rPr lang="en-US" smtClean="0"/>
-              <a:t>1/22/2019</a:t>
+              <a:t>1/23/2019</a:t>
             </a:fld>
             <a:endParaRPr lang="en-US"/>
           </a:p>
@@ -3434,7 +3438,7 @@
           <a:p>
             <a:fld id="{4F16EEC3-5546-47BF-AA5B-42CBAFF1D1AF}" type="datetimeFigureOut">
               <a:rPr lang="en-US" smtClean="0"/>
-              <a:t>1/22/2019</a:t>
+              <a:t>1/23/2019</a:t>
             </a:fld>
             <a:endParaRPr lang="en-US"/>
           </a:p>
@@ -3856,7 +3860,7 @@
           <a:p>
             <a:fld id="{4F16EEC3-5546-47BF-AA5B-42CBAFF1D1AF}" type="datetimeFigureOut">
               <a:rPr lang="en-US" smtClean="0"/>
-              <a:t>1/22/2019</a:t>
+              <a:t>1/23/2019</a:t>
             </a:fld>
             <a:endParaRPr lang="en-US"/>
           </a:p>
@@ -3974,7 +3978,7 @@
           <a:p>
             <a:fld id="{4F16EEC3-5546-47BF-AA5B-42CBAFF1D1AF}" type="datetimeFigureOut">
               <a:rPr lang="en-US" smtClean="0"/>
-              <a:t>1/22/2019</a:t>
+              <a:t>1/23/2019</a:t>
             </a:fld>
             <a:endParaRPr lang="en-US"/>
           </a:p>
@@ -4069,7 +4073,7 @@
           <a:p>
             <a:fld id="{4F16EEC3-5546-47BF-AA5B-42CBAFF1D1AF}" type="datetimeFigureOut">
               <a:rPr lang="en-US" smtClean="0"/>
-              <a:t>1/22/2019</a:t>
+              <a:t>1/23/2019</a:t>
             </a:fld>
             <a:endParaRPr lang="en-US"/>
           </a:p>
@@ -4346,7 +4350,7 @@
           <a:p>
             <a:fld id="{4F16EEC3-5546-47BF-AA5B-42CBAFF1D1AF}" type="datetimeFigureOut">
               <a:rPr lang="en-US" smtClean="0"/>
-              <a:t>1/22/2019</a:t>
+              <a:t>1/23/2019</a:t>
             </a:fld>
             <a:endParaRPr lang="en-US"/>
           </a:p>
@@ -4599,7 +4603,7 @@
           <a:p>
             <a:fld id="{4F16EEC3-5546-47BF-AA5B-42CBAFF1D1AF}" type="datetimeFigureOut">
               <a:rPr lang="en-US" smtClean="0"/>
-              <a:t>1/22/2019</a:t>
+              <a:t>1/23/2019</a:t>
             </a:fld>
             <a:endParaRPr lang="en-US"/>
           </a:p>
@@ -4812,7 +4816,7 @@
           <a:p>
             <a:fld id="{4F16EEC3-5546-47BF-AA5B-42CBAFF1D1AF}" type="datetimeFigureOut">
               <a:rPr lang="en-US" smtClean="0"/>
-              <a:t>1/22/2019</a:t>
+              <a:t>1/23/2019</a:t>
             </a:fld>
             <a:endParaRPr lang="en-US"/>
           </a:p>
@@ -5226,10 +5230,18 @@
           <a:lstStyle/>
           <a:p>
             <a:r>
-              <a:rPr lang="en-US" dirty="0" smtClean="0"/>
+              <a:rPr lang="en-US" b="1" dirty="0" smtClean="0">
+                <a:solidFill>
+                  <a:schemeClr val="tx1"/>
+                </a:solidFill>
+              </a:rPr>
               <a:t>By: Ben Keeper</a:t>
             </a:r>
-            <a:endParaRPr lang="en-US" dirty="0"/>
+            <a:endParaRPr lang="en-US" b="1" dirty="0">
+              <a:solidFill>
+                <a:schemeClr val="tx1"/>
+              </a:solidFill>
+            </a:endParaRPr>
           </a:p>
         </p:txBody>
       </p:sp>
@@ -5294,11 +5306,7 @@
           <a:p>
             <a:r>
               <a:rPr lang="en-US" sz="7200" dirty="0" smtClean="0"/>
-              <a:t>Slide </a:t>
-            </a:r>
-            <a:r>
-              <a:rPr lang="en-US" sz="7200" dirty="0" smtClean="0"/>
-              <a:t>Backups</a:t>
+              <a:t>Appendix</a:t>
             </a:r>
             <a:endParaRPr lang="en-US" sz="7200" dirty="0"/>
           </a:p>
@@ -5347,13 +5355,17 @@
         <p:spPr/>
         <p:txBody>
           <a:bodyPr>
-            <a:normAutofit/>
+            <a:normAutofit fontScale="90000"/>
           </a:bodyPr>
           <a:lstStyle/>
           <a:p>
             <a:r>
               <a:rPr lang="en-US" dirty="0" smtClean="0"/>
-              <a:t>First Business Question</a:t>
+              <a:t>First Business </a:t>
+            </a:r>
+            <a:r>
+              <a:rPr lang="en-US" dirty="0" smtClean="0"/>
+              <a:t>Question Thought Process</a:t>
             </a:r>
             <a:endParaRPr lang="en-US" dirty="0"/>
           </a:p>
@@ -5369,7 +5381,12 @@
             <p:ph idx="1"/>
           </p:nvPr>
         </p:nvSpPr>
-        <p:spPr/>
+        <p:spPr>
+          <a:xfrm>
+            <a:off x="457200" y="1600200"/>
+            <a:ext cx="8229600" cy="4800600"/>
+          </a:xfrm>
+        </p:spPr>
         <p:txBody>
           <a:bodyPr>
             <a:normAutofit fontScale="77500" lnSpcReduction="20000"/>
@@ -5393,7 +5410,6 @@
               <a:rPr lang="en-US" dirty="0" smtClean="0"/>
               <a:t>Interpretation:</a:t>
             </a:r>
-            <a:endParaRPr lang="en-US" dirty="0" smtClean="0"/>
           </a:p>
           <a:p>
             <a:pPr lvl="1"/>
@@ -5427,6 +5443,13 @@
             <a:r>
               <a:rPr lang="en-US" dirty="0" smtClean="0"/>
               <a:t>The requester desires the most current information on each country</a:t>
+            </a:r>
+          </a:p>
+          <a:p>
+            <a:pPr lvl="1"/>
+            <a:r>
+              <a:rPr lang="en-US" dirty="0" smtClean="0"/>
+              <a:t>Regions will never contain any data of business value to the requestor;  regions were skipped as there was no data</a:t>
             </a:r>
             <a:endParaRPr lang="en-US" dirty="0"/>
           </a:p>
@@ -5521,7 +5544,7 @@
           <a:graphicData uri="http://schemas.openxmlformats.org/presentationml/2006/ole">
             <mc:AlternateContent xmlns:mc="http://schemas.openxmlformats.org/markup-compatibility/2006">
               <mc:Choice xmlns:v="urn:schemas-microsoft-com:vml" Requires="v">
-                <p:oleObj spid="_x0000_s1172" name="Worksheet" r:id="rId3" imgW="5074938" imgH="7505625" progId="Excel.Sheet.12">
+                <p:oleObj spid="_x0000_s1260" name="Worksheet" r:id="rId3" imgW="5074938" imgH="7505625" progId="Excel.Sheet.12">
                   <p:embed/>
                 </p:oleObj>
               </mc:Choice>
@@ -5578,7 +5601,7 @@
           <a:graphicData uri="http://schemas.openxmlformats.org/presentationml/2006/ole">
             <mc:AlternateContent xmlns:mc="http://schemas.openxmlformats.org/markup-compatibility/2006">
               <mc:Choice xmlns:v="urn:schemas-microsoft-com:vml" Requires="v">
-                <p:oleObj spid="_x0000_s1173" name="Worksheet" r:id="rId5" imgW="5074938" imgH="7688633" progId="Excel.Sheet.12">
+                <p:oleObj spid="_x0000_s1261" name="Worksheet" r:id="rId5" imgW="5074938" imgH="7688633" progId="Excel.Sheet.12">
                   <p:embed/>
                 </p:oleObj>
               </mc:Choice>
@@ -5662,7 +5685,11 @@
           <a:p>
             <a:r>
               <a:rPr lang="en-US" sz="4000" dirty="0" smtClean="0"/>
-              <a:t>Second Business Question</a:t>
+              <a:t>Second Business </a:t>
+            </a:r>
+            <a:r>
+              <a:rPr lang="en-US" sz="4000" dirty="0" smtClean="0"/>
+              <a:t>Question Thought Process</a:t>
             </a:r>
             <a:endParaRPr lang="en-US" sz="4000" dirty="0"/>
           </a:p>
@@ -5700,8 +5727,13 @@
           <a:p>
             <a:r>
               <a:rPr lang="en-US" dirty="0" smtClean="0"/>
-              <a:t>Translation by a future hadoop engineer:</a:t>
-            </a:r>
+              <a:t>Interpretation</a:t>
+            </a:r>
+            <a:r>
+              <a:rPr lang="en-US" dirty="0" smtClean="0"/>
+              <a:t>:</a:t>
+            </a:r>
+            <a:endParaRPr lang="en-US" dirty="0" smtClean="0"/>
           </a:p>
           <a:p>
             <a:pPr lvl="1"/>
@@ -5792,15 +5824,7 @@
           <a:p>
             <a:r>
               <a:rPr lang="en-US" dirty="0" smtClean="0"/>
-              <a:t>Second Question </a:t>
-            </a:r>
-            <a:r>
-              <a:rPr lang="en-US" dirty="0" smtClean="0"/>
-              <a:t>Hadoop </a:t>
-            </a:r>
-            <a:r>
-              <a:rPr lang="en-US" dirty="0" smtClean="0"/>
-              <a:t>Output and Post-Processing</a:t>
+              <a:t>Second Question Hadoop Output and Post-Processing</a:t>
             </a:r>
             <a:endParaRPr lang="en-US" dirty="0"/>
           </a:p>
@@ -6090,13 +6114,17 @@
         <p:spPr/>
         <p:txBody>
           <a:bodyPr>
-            <a:normAutofit/>
+            <a:normAutofit fontScale="90000"/>
           </a:bodyPr>
           <a:lstStyle/>
           <a:p>
             <a:r>
               <a:rPr lang="en-US" dirty="0" smtClean="0"/>
-              <a:t>Third Business Question</a:t>
+              <a:t>Third Business </a:t>
+            </a:r>
+            <a:r>
+              <a:rPr lang="en-US" dirty="0" smtClean="0"/>
+              <a:t>Question Thought Process</a:t>
             </a:r>
             <a:endParaRPr lang="en-US" dirty="0"/>
           </a:p>
@@ -6134,13 +6162,8 @@
           <a:p>
             <a:r>
               <a:rPr lang="en-US" dirty="0" smtClean="0"/>
-              <a:t>Interpretation</a:t>
-            </a:r>
-            <a:r>
-              <a:rPr lang="en-US" dirty="0" smtClean="0"/>
-              <a:t>:</a:t>
-            </a:r>
-            <a:endParaRPr lang="en-US" dirty="0" smtClean="0"/>
+              <a:t>Interpretation:</a:t>
+            </a:r>
           </a:p>
           <a:p>
             <a:pPr lvl="1"/>
@@ -6206,12 +6229,18 @@
         </p:nvSpPr>
         <p:spPr/>
         <p:txBody>
-          <a:bodyPr/>
+          <a:bodyPr>
+            <a:normAutofit fontScale="90000"/>
+          </a:bodyPr>
           <a:lstStyle/>
           <a:p>
             <a:r>
               <a:rPr lang="en-US" dirty="0" smtClean="0"/>
-              <a:t>Fourth Business Question</a:t>
+              <a:t>Fourth Business </a:t>
+            </a:r>
+            <a:r>
+              <a:rPr lang="en-US" dirty="0" smtClean="0"/>
+              <a:t>Question Thought Process</a:t>
             </a:r>
             <a:endParaRPr lang="en-US" dirty="0"/>
           </a:p>
@@ -6256,9 +6285,14 @@
           </a:p>
           <a:p>
             <a:r>
-              <a:rPr lang="en-US" dirty="0"/>
-              <a:t>Translation by a future hadoop engineer:</a:t>
-            </a:r>
+              <a:rPr lang="en-US" dirty="0" smtClean="0"/>
+              <a:t>Interpretation</a:t>
+            </a:r>
+            <a:r>
+              <a:rPr lang="en-US" dirty="0" smtClean="0"/>
+              <a:t>:</a:t>
+            </a:r>
+            <a:endParaRPr lang="en-US" dirty="0"/>
           </a:p>
           <a:p>
             <a:pPr lvl="1"/>
@@ -6476,7 +6510,12 @@
             <p:ph type="title"/>
           </p:nvPr>
         </p:nvSpPr>
-        <p:spPr/>
+        <p:spPr>
+          <a:xfrm>
+            <a:off x="457200" y="-152400"/>
+            <a:ext cx="8229600" cy="1143000"/>
+          </a:xfrm>
+        </p:spPr>
         <p:txBody>
           <a:bodyPr>
             <a:normAutofit/>
@@ -6500,14 +6539,14 @@
           <p:nvPr>
             <p:extLst>
               <p:ext uri="{D42A27DB-BD31-4B8C-83A1-F6EECF244321}">
-                <p14:modId xmlns:p14="http://schemas.microsoft.com/office/powerpoint/2010/main" val="804693871"/>
+                <p14:modId xmlns:p14="http://schemas.microsoft.com/office/powerpoint/2010/main" val="1374014686"/>
               </p:ext>
             </p:extLst>
           </p:nvPr>
         </p:nvGraphicFramePr>
         <p:xfrm>
-          <a:off x="44263" y="1650102"/>
-          <a:ext cx="4419600" cy="3733800"/>
+          <a:off x="44262" y="1484531"/>
+          <a:ext cx="4451537" cy="3899371"/>
         </p:xfrm>
         <a:graphic>
           <a:graphicData uri="http://schemas.openxmlformats.org/drawingml/2006/chart">
@@ -6523,8 +6562,8 @@
         </p:nvSpPr>
         <p:spPr>
           <a:xfrm>
-            <a:off x="145473" y="1280770"/>
-            <a:ext cx="4217180" cy="369332"/>
+            <a:off x="145473" y="838200"/>
+            <a:ext cx="3217291" cy="646331"/>
           </a:xfrm>
           <a:prstGeom prst="rect">
             <a:avLst/>
@@ -6539,7 +6578,13 @@
           <a:p>
             <a:r>
               <a:rPr lang="en-US" dirty="0" smtClean="0"/>
-              <a:t>Average Gross Graduation Ratio by Region</a:t>
+              <a:t>Average Gross Graduation Ratio </a:t>
+            </a:r>
+          </a:p>
+          <a:p>
+            <a:r>
+              <a:rPr lang="en-US" dirty="0" smtClean="0"/>
+              <a:t>(Tertiary Education) by Region</a:t>
             </a:r>
             <a:endParaRPr lang="en-US" dirty="0"/>
           </a:p>
@@ -6554,14 +6599,14 @@
           <p:nvPr>
             <p:extLst>
               <p:ext uri="{D42A27DB-BD31-4B8C-83A1-F6EECF244321}">
-                <p14:modId xmlns:p14="http://schemas.microsoft.com/office/powerpoint/2010/main" val="3228773400"/>
+                <p14:modId xmlns:p14="http://schemas.microsoft.com/office/powerpoint/2010/main" val="67829296"/>
               </p:ext>
             </p:extLst>
           </p:nvPr>
         </p:nvGraphicFramePr>
         <p:xfrm>
-          <a:off x="4547554" y="1295400"/>
-          <a:ext cx="4447094" cy="3766250"/>
+          <a:off x="4572000" y="838200"/>
+          <a:ext cx="4422648" cy="4223450"/>
         </p:xfrm>
         <a:graphic>
           <a:graphicData uri="http://schemas.openxmlformats.org/drawingml/2006/chart">
@@ -6632,7 +6677,7 @@
           <a:graphicData uri="http://schemas.openxmlformats.org/presentationml/2006/ole">
             <mc:AlternateContent xmlns:mc="http://schemas.openxmlformats.org/markup-compatibility/2006">
               <mc:Choice xmlns:v="urn:schemas-microsoft-com:vml" Requires="v">
-                <p:oleObj spid="_x0000_s2121" name="Worksheet" r:id="rId5" imgW="3619371" imgH="1653401" progId="Excel.Sheet.12">
+                <p:oleObj spid="_x0000_s2165" name="Worksheet" r:id="rId5" imgW="3619371" imgH="1653401" progId="Excel.Sheet.12">
                   <p:embed/>
                 </p:oleObj>
               </mc:Choice>
@@ -7278,8 +7323,8 @@
         </p:nvSpPr>
         <p:spPr>
           <a:xfrm>
-            <a:off x="76200" y="5913047"/>
-            <a:ext cx="2258568" cy="307777"/>
+            <a:off x="932965" y="5365548"/>
+            <a:ext cx="1353035" cy="923330"/>
           </a:xfrm>
           <a:prstGeom prst="rect">
             <a:avLst/>
@@ -7298,10 +7343,10 @@
           <a:lstStyle/>
           <a:p>
             <a:r>
-              <a:rPr lang="en-US" sz="1400" dirty="0" smtClean="0"/>
+              <a:rPr lang="en-US" b="1" dirty="0" smtClean="0"/>
               <a:t>Average Absolute % Change</a:t>
             </a:r>
-            <a:endParaRPr lang="en-US" sz="1400" dirty="0"/>
+            <a:endParaRPr lang="en-US" b="1" dirty="0"/>
           </a:p>
         </p:txBody>
       </p:sp>
@@ -7334,15 +7379,19 @@
           <a:p>
             <a:r>
               <a:rPr lang="en-US" dirty="0" smtClean="0"/>
-              <a:t>NOTE:  See the slide backups section for scatter plots for the other </a:t>
+              <a:t>NOTE:  See the </a:t>
             </a:r>
             <a:r>
               <a:rPr lang="en-US" dirty="0" smtClean="0"/>
-              <a:t>two </a:t>
+              <a:t>appendix</a:t>
             </a:r>
             <a:r>
               <a:rPr lang="en-US" dirty="0" smtClean="0"/>
-              <a:t>education groups</a:t>
+              <a:t> </a:t>
+            </a:r>
+            <a:r>
+              <a:rPr lang="en-US" dirty="0" smtClean="0"/>
+              <a:t>for scatter plots for the other two education groups</a:t>
             </a:r>
             <a:endParaRPr lang="en-US" dirty="0"/>
           </a:p>
@@ -7356,8 +7405,8 @@
         </p:nvSpPr>
         <p:spPr>
           <a:xfrm>
-            <a:off x="588239" y="4953000"/>
-            <a:ext cx="1755673" cy="369332"/>
+            <a:off x="527192" y="4968507"/>
+            <a:ext cx="1779590" cy="369332"/>
           </a:xfrm>
           <a:prstGeom prst="rect">
             <a:avLst/>
@@ -7376,10 +7425,10 @@
           <a:lstStyle/>
           <a:p>
             <a:r>
-              <a:rPr lang="en-US" dirty="0" smtClean="0"/>
+              <a:rPr lang="en-US" b="1" dirty="0" smtClean="0"/>
               <a:t>Education Group</a:t>
             </a:r>
-            <a:endParaRPr lang="en-US" dirty="0"/>
+            <a:endParaRPr lang="en-US" b="1" dirty="0"/>
           </a:p>
         </p:txBody>
       </p:sp>
@@ -7560,15 +7609,7 @@
           <a:p>
             <a:r>
               <a:rPr lang="en-US" sz="3600" dirty="0" smtClean="0"/>
-              <a:t>Question </a:t>
-            </a:r>
-            <a:r>
-              <a:rPr lang="en-US" sz="3600" dirty="0" smtClean="0"/>
-              <a:t>3 R</a:t>
-            </a:r>
-            <a:r>
-              <a:rPr lang="en-US" sz="3600" dirty="0" smtClean="0"/>
-              <a:t>esults</a:t>
+              <a:t>Question 3 Results</a:t>
             </a:r>
             <a:endParaRPr lang="en-US" sz="3600" dirty="0"/>
           </a:p>
@@ -7627,23 +7668,7 @@
           <a:p>
             <a:r>
               <a:rPr lang="en-US" dirty="0" smtClean="0"/>
-              <a:t>NOTE:  See </a:t>
-            </a:r>
-            <a:r>
-              <a:rPr lang="en-US" dirty="0" smtClean="0"/>
-              <a:t>accompanying Excel document for the</a:t>
-            </a:r>
-            <a:r>
-              <a:rPr lang="en-US" dirty="0" smtClean="0"/>
-              <a:t> table</a:t>
-            </a:r>
-            <a:r>
-              <a:rPr lang="en-US" dirty="0" smtClean="0"/>
-              <a:t> </a:t>
-            </a:r>
-            <a:r>
-              <a:rPr lang="en-US" dirty="0" smtClean="0"/>
-              <a:t>of results</a:t>
+              <a:t>NOTE:  See accompanying Excel document for the table of results</a:t>
             </a:r>
             <a:endParaRPr lang="en-US" dirty="0"/>
           </a:p>
@@ -7828,23 +7853,7 @@
           <a:p>
             <a:r>
               <a:rPr lang="en-US" dirty="0" smtClean="0"/>
-              <a:t>NOTE:  See </a:t>
-            </a:r>
-            <a:r>
-              <a:rPr lang="en-US" dirty="0" smtClean="0"/>
-              <a:t>accompanying Excel document for the</a:t>
-            </a:r>
-            <a:r>
-              <a:rPr lang="en-US" dirty="0" smtClean="0"/>
-              <a:t> table</a:t>
-            </a:r>
-            <a:r>
-              <a:rPr lang="en-US" dirty="0" smtClean="0"/>
-              <a:t> </a:t>
-            </a:r>
-            <a:r>
-              <a:rPr lang="en-US" dirty="0" smtClean="0"/>
-              <a:t>of results</a:t>
+              <a:t>NOTE:  See accompanying Excel document for the table of results</a:t>
             </a:r>
             <a:endParaRPr lang="en-US" dirty="0"/>
           </a:p>
@@ -7913,31 +7922,44 @@
             <p:ph idx="1"/>
           </p:nvPr>
         </p:nvSpPr>
-        <p:spPr/>
+        <p:spPr>
+          <a:xfrm>
+            <a:off x="457200" y="1600200"/>
+            <a:ext cx="8229600" cy="4953000"/>
+          </a:xfrm>
+        </p:spPr>
         <p:txBody>
           <a:bodyPr>
-            <a:normAutofit fontScale="85000" lnSpcReduction="10000"/>
+            <a:normAutofit fontScale="85000" lnSpcReduction="20000"/>
           </a:bodyPr>
           <a:lstStyle/>
           <a:p>
             <a:r>
               <a:rPr lang="en-US" dirty="0" smtClean="0"/>
-              <a:t>Considered the founding of Revature back in 2003</a:t>
-            </a:r>
+              <a:t>Considered the founding of Revature back in </a:t>
+            </a:r>
+            <a:r>
+              <a:rPr lang="en-US" dirty="0" smtClean="0"/>
+              <a:t>2003 (source: “Glassdoor”)</a:t>
+            </a:r>
+          </a:p>
+          <a:p>
+            <a:r>
+              <a:rPr lang="en-US" dirty="0" smtClean="0"/>
+              <a:t>Assume that Revature was founded in the United States in the year 2003</a:t>
+            </a:r>
+            <a:endParaRPr lang="en-US" dirty="0" smtClean="0"/>
           </a:p>
           <a:p>
             <a:r>
               <a:rPr lang="en-US" dirty="0"/>
-              <a:t>The provided csv file contained data for each country and region on two </a:t>
+              <a:t>The provided csv file contained </a:t>
             </a:r>
             <a:r>
               <a:rPr lang="en-US" dirty="0" smtClean="0"/>
-              <a:t>of the major factors </a:t>
-            </a:r>
-            <a:r>
-              <a:rPr lang="en-US" dirty="0"/>
-              <a:t>related to creating a new business:</a:t>
-            </a:r>
+              <a:t>the following data:</a:t>
+            </a:r>
+            <a:endParaRPr lang="en-US" dirty="0"/>
           </a:p>
           <a:p>
             <a:pPr marL="971550" lvl="1" indent="-514350">
@@ -7946,7 +7968,19 @@
             </a:pPr>
             <a:r>
               <a:rPr lang="en-US" dirty="0"/>
-              <a:t>The time in days required to do start up the business</a:t>
+              <a:t>The time in days required to do start up </a:t>
+            </a:r>
+            <a:r>
+              <a:rPr lang="en-US" dirty="0"/>
+              <a:t>a</a:t>
+            </a:r>
+            <a:r>
+              <a:rPr lang="en-US" dirty="0" smtClean="0"/>
+              <a:t> </a:t>
+            </a:r>
+            <a:r>
+              <a:rPr lang="en-US" dirty="0"/>
+              <a:t>business</a:t>
             </a:r>
           </a:p>
           <a:p>
@@ -7956,7 +7990,15 @@
             </a:pPr>
             <a:r>
               <a:rPr lang="en-US" dirty="0"/>
-              <a:t>The number of procedures necessary to register the </a:t>
+              <a:t>The number of procedures necessary to register </a:t>
+            </a:r>
+            <a:r>
+              <a:rPr lang="en-US" dirty="0"/>
+              <a:t>a</a:t>
+            </a:r>
+            <a:r>
+              <a:rPr lang="en-US" dirty="0" smtClean="0"/>
+              <a:t> </a:t>
             </a:r>
             <a:r>
               <a:rPr lang="en-US" dirty="0" smtClean="0"/>
@@ -7970,21 +8012,8 @@
                   <a:srgbClr val="FF0000"/>
                 </a:solidFill>
               </a:rPr>
-              <a:t>Custom business </a:t>
-            </a:r>
-            <a:r>
-              <a:rPr lang="en-US" dirty="0" smtClean="0">
-                <a:solidFill>
-                  <a:srgbClr val="FF0000"/>
-                </a:solidFill>
-              </a:rPr>
-              <a:t>question:</a:t>
-            </a:r>
-            <a:endParaRPr lang="en-US" dirty="0" smtClean="0">
-              <a:solidFill>
-                <a:srgbClr val="FF0000"/>
-              </a:solidFill>
-            </a:endParaRPr>
+              <a:t>Custom business question:</a:t>
+            </a:r>
           </a:p>
           <a:p>
             <a:pPr lvl="1"/>
@@ -8010,8 +8039,32 @@
                   <a:srgbClr val="FF0000"/>
                 </a:solidFill>
               </a:rPr>
-              <a:t>evature would have encountered the least amount of red tape     </a:t>
-            </a:r>
+              <a:t>evature would have encountered the least amount of red </a:t>
+            </a:r>
+            <a:r>
+              <a:rPr lang="en-US" dirty="0" smtClean="0">
+                <a:solidFill>
+                  <a:srgbClr val="FF0000"/>
+                </a:solidFill>
+              </a:rPr>
+              <a:t>tape</a:t>
+            </a:r>
+          </a:p>
+          <a:p>
+            <a:pPr lvl="1"/>
+            <a:r>
+              <a:rPr lang="en-US" dirty="0" smtClean="0">
+                <a:solidFill>
+                  <a:srgbClr val="FF0000"/>
+                </a:solidFill>
+              </a:rPr>
+              <a:t>Follow-up:  Compare the optimal choice to choosing the United States     </a:t>
+            </a:r>
+            <a:endParaRPr lang="en-US" dirty="0" smtClean="0">
+              <a:solidFill>
+                <a:srgbClr val="FF0000"/>
+              </a:solidFill>
+            </a:endParaRPr>
           </a:p>
           <a:p>
             <a:pPr lvl="1"/>
@@ -8087,7 +8140,7 @@
         <p:spPr>
           <a:xfrm>
             <a:off x="457200" y="1600200"/>
-            <a:ext cx="8229600" cy="4800600"/>
+            <a:ext cx="8229600" cy="5181600"/>
           </a:xfrm>
         </p:spPr>
         <p:txBody>
@@ -8097,44 +8150,101 @@
           <a:lstStyle/>
           <a:p>
             <a:r>
+              <a:rPr lang="en-US" sz="2400" dirty="0" smtClean="0"/>
+              <a:t>Map-Reduce routine for this request:</a:t>
+            </a:r>
+          </a:p>
+          <a:p>
+            <a:pPr lvl="1"/>
+            <a:r>
               <a:rPr lang="en-US" sz="2000" dirty="0" smtClean="0"/>
-              <a:t>Map-Reduce routine for this request:</a:t>
+              <a:t>Find all countries/regions with a 2003 data point for the time required to start a business and the number of procedures needed to start a business</a:t>
             </a:r>
           </a:p>
           <a:p>
             <a:pPr lvl="1"/>
             <a:r>
-              <a:rPr lang="en-US" sz="1800" dirty="0" smtClean="0"/>
-              <a:t>Find all countries/regions with a 2003 data point for the time required to start a business and the number of procedures needed to start a business</a:t>
-            </a:r>
-          </a:p>
-          <a:p>
-            <a:pPr lvl="1"/>
-            <a:r>
-              <a:rPr lang="en-US" sz="1800" dirty="0" smtClean="0"/>
+              <a:rPr lang="en-US" sz="2000" dirty="0" smtClean="0"/>
               <a:t>After all of the data points are obtained, return only those countries/regions where the time needed for start-up is &lt; 45 days and the number of registration procedures is &lt;= 10</a:t>
             </a:r>
           </a:p>
           <a:p>
             <a:r>
-              <a:rPr lang="en-US" sz="2000" dirty="0" smtClean="0">
+              <a:rPr lang="en-US" sz="2400" dirty="0" smtClean="0">
                 <a:solidFill>
                   <a:srgbClr val="FF0000"/>
                 </a:solidFill>
               </a:rPr>
-              <a:t>Based on these metric alone, the optimal country for the founding of Revature would have been Australia with a start-up time of only 3 days and only 2 required registration procedures</a:t>
-            </a:r>
-          </a:p>
-          <a:p>
+              <a:t>Based on these </a:t>
+            </a:r>
+            <a:r>
+              <a:rPr lang="en-US" sz="2400" dirty="0" smtClean="0">
+                <a:solidFill>
+                  <a:srgbClr val="FF0000"/>
+                </a:solidFill>
+              </a:rPr>
+              <a:t>metrics </a:t>
+            </a:r>
+            <a:r>
+              <a:rPr lang="en-US" sz="2400" dirty="0" smtClean="0">
+                <a:solidFill>
+                  <a:srgbClr val="FF0000"/>
+                </a:solidFill>
+              </a:rPr>
+              <a:t>alone, the optimal country for the founding of Revature would have been Australia with a start-up time of only 3 days and </a:t>
+            </a:r>
+            <a:r>
+              <a:rPr lang="en-US" sz="2400" dirty="0" smtClean="0">
+                <a:solidFill>
+                  <a:srgbClr val="FF0000"/>
+                </a:solidFill>
+              </a:rPr>
+              <a:t>only 3</a:t>
+            </a:r>
+            <a:r>
+              <a:rPr lang="en-US" sz="2400" dirty="0" smtClean="0">
+                <a:solidFill>
+                  <a:srgbClr val="FF0000"/>
+                </a:solidFill>
+              </a:rPr>
+              <a:t> </a:t>
+            </a:r>
+            <a:r>
+              <a:rPr lang="en-US" sz="2400" dirty="0" smtClean="0">
+                <a:solidFill>
+                  <a:srgbClr val="FF0000"/>
+                </a:solidFill>
+              </a:rPr>
+              <a:t>required registration procedures</a:t>
+            </a:r>
+          </a:p>
+          <a:p>
+            <a:r>
+              <a:rPr lang="en-US" sz="2400" dirty="0" smtClean="0"/>
+              <a:t>The United States as compared to the optimal choice:</a:t>
+            </a:r>
+          </a:p>
+          <a:p>
+            <a:pPr lvl="1"/>
             <a:r>
               <a:rPr lang="en-US" sz="2000" dirty="0" smtClean="0"/>
-              <a:t>The continent of North America as a whole was the region with the fewest days of startup and the fewest registration procedures</a:t>
-            </a:r>
-          </a:p>
-          <a:p>
+              <a:t>Startup in the U.S. was 3 </a:t>
+            </a:r>
             <a:r>
               <a:rPr lang="en-US" sz="2000" dirty="0" smtClean="0"/>
-              <a:t>If Revature had picked the United States instead of the optimal choice of Australia, then startup would have been 3 days longer than a founding within Australia.  Revature would have needed to go through twice as much red tape than in Australia </a:t>
+              <a:t>days longer </a:t>
+            </a:r>
+            <a:endParaRPr lang="en-US" sz="2000" dirty="0" smtClean="0"/>
+          </a:p>
+          <a:p>
+            <a:pPr lvl="1"/>
+            <a:r>
+              <a:rPr lang="en-US" sz="2000" dirty="0" smtClean="0"/>
+              <a:t>The U.S. had 3 more </a:t>
+            </a:r>
+            <a:r>
+              <a:rPr lang="en-US" sz="2000" dirty="0" smtClean="0"/>
+              <a:t>registration procedures</a:t>
             </a:r>
             <a:endParaRPr lang="en-US" sz="2000" dirty="0"/>
           </a:p>

</xml_diff>

<commit_message>
Further revisions to Powerpoint
Added further information to the appendix
such as potential confounding variables.
</commit_message>
<xml_diff>
--- a/Project1-Presentation-Ben-Keeper.pptx
+++ b/Project1-Presentation-Ben-Keeper.pptx
@@ -269,11 +269,11 @@
           <c:showBubbleSize val="0"/>
         </c:dLbls>
         <c:gapWidth val="150"/>
-        <c:axId val="123454976"/>
-        <c:axId val="123456896"/>
+        <c:axId val="174315008"/>
+        <c:axId val="174316928"/>
       </c:barChart>
       <c:catAx>
-        <c:axId val="123454976"/>
+        <c:axId val="174315008"/>
         <c:scaling>
           <c:orientation val="minMax"/>
         </c:scaling>
@@ -306,7 +306,7 @@
         <c:majorTickMark val="out"/>
         <c:minorTickMark val="none"/>
         <c:tickLblPos val="nextTo"/>
-        <c:crossAx val="123456896"/>
+        <c:crossAx val="174316928"/>
         <c:crosses val="autoZero"/>
         <c:auto val="1"/>
         <c:lblAlgn val="ctr"/>
@@ -314,7 +314,7 @@
         <c:noMultiLvlLbl val="0"/>
       </c:catAx>
       <c:valAx>
-        <c:axId val="123456896"/>
+        <c:axId val="174316928"/>
         <c:scaling>
           <c:orientation val="minMax"/>
         </c:scaling>
@@ -348,7 +348,7 @@
         <c:majorTickMark val="out"/>
         <c:minorTickMark val="none"/>
         <c:tickLblPos val="nextTo"/>
-        <c:crossAx val="123454976"/>
+        <c:crossAx val="174315008"/>
         <c:crosses val="autoZero"/>
         <c:crossBetween val="between"/>
       </c:valAx>
@@ -764,11 +764,11 @@
           <c:showBubbleSize val="0"/>
         </c:dLbls>
         <c:gapWidth val="150"/>
-        <c:axId val="143116544"/>
-        <c:axId val="143126912"/>
+        <c:axId val="131512576"/>
+        <c:axId val="131518848"/>
       </c:barChart>
       <c:catAx>
-        <c:axId val="143116544"/>
+        <c:axId val="131512576"/>
         <c:scaling>
           <c:orientation val="minMax"/>
         </c:scaling>
@@ -801,7 +801,7 @@
         <c:majorTickMark val="out"/>
         <c:minorTickMark val="none"/>
         <c:tickLblPos val="nextTo"/>
-        <c:crossAx val="143126912"/>
+        <c:crossAx val="131518848"/>
         <c:crosses val="autoZero"/>
         <c:auto val="1"/>
         <c:lblAlgn val="ctr"/>
@@ -809,7 +809,7 @@
         <c:noMultiLvlLbl val="0"/>
       </c:catAx>
       <c:valAx>
-        <c:axId val="143126912"/>
+        <c:axId val="131518848"/>
         <c:scaling>
           <c:orientation val="minMax"/>
           <c:max val="100"/>
@@ -851,7 +851,7 @@
         <c:majorTickMark val="out"/>
         <c:minorTickMark val="none"/>
         <c:tickLblPos val="nextTo"/>
-        <c:crossAx val="143116544"/>
+        <c:crossAx val="131512576"/>
         <c:crosses val="autoZero"/>
         <c:crossBetween val="between"/>
         <c:majorUnit val="5"/>
@@ -1097,11 +1097,11 @@
           <c:showBubbleSize val="0"/>
         </c:dLbls>
         <c:gapWidth val="150"/>
-        <c:axId val="123318272"/>
-        <c:axId val="123320192"/>
+        <c:axId val="174280704"/>
+        <c:axId val="174282624"/>
       </c:barChart>
       <c:catAx>
-        <c:axId val="123318272"/>
+        <c:axId val="174280704"/>
         <c:scaling>
           <c:orientation val="minMax"/>
         </c:scaling>
@@ -1134,7 +1134,7 @@
         <c:majorTickMark val="out"/>
         <c:minorTickMark val="none"/>
         <c:tickLblPos val="nextTo"/>
-        <c:crossAx val="123320192"/>
+        <c:crossAx val="174282624"/>
         <c:crosses val="autoZero"/>
         <c:auto val="1"/>
         <c:lblAlgn val="ctr"/>
@@ -1142,7 +1142,7 @@
         <c:noMultiLvlLbl val="0"/>
       </c:catAx>
       <c:valAx>
-        <c:axId val="123320192"/>
+        <c:axId val="174282624"/>
         <c:scaling>
           <c:orientation val="minMax"/>
           <c:max val="100"/>
@@ -1184,7 +1184,7 @@
         <c:majorTickMark val="out"/>
         <c:minorTickMark val="none"/>
         <c:tickLblPos val="nextTo"/>
-        <c:crossAx val="123318272"/>
+        <c:crossAx val="174280704"/>
         <c:crosses val="autoZero"/>
         <c:crossBetween val="between"/>
         <c:majorUnit val="5"/>
@@ -2048,11 +2048,7 @@
             </a:r>
             <a:r>
               <a:rPr lang="en-US" dirty="0" smtClean="0"/>
-              <a:t>“Project-1-Post-Processing-of-Hadoop Results.xlsx</a:t>
-            </a:r>
-            <a:r>
-              <a:rPr lang="en-US" dirty="0" smtClean="0"/>
-              <a:t>”</a:t>
+              <a:t>“Project-1-Post-Processing-of-Hadoop Results.xlsx”</a:t>
             </a:r>
             <a:endParaRPr lang="en-US" dirty="0"/>
           </a:p>
@@ -5361,11 +5357,7 @@
           <a:p>
             <a:r>
               <a:rPr lang="en-US" dirty="0" smtClean="0"/>
-              <a:t>First Business </a:t>
-            </a:r>
-            <a:r>
-              <a:rPr lang="en-US" dirty="0" smtClean="0"/>
-              <a:t>Question Thought Process</a:t>
+              <a:t>First Business Question Thought Process</a:t>
             </a:r>
             <a:endParaRPr lang="en-US" dirty="0"/>
           </a:p>
@@ -5544,7 +5536,7 @@
           <a:graphicData uri="http://schemas.openxmlformats.org/presentationml/2006/ole">
             <mc:AlternateContent xmlns:mc="http://schemas.openxmlformats.org/markup-compatibility/2006">
               <mc:Choice xmlns:v="urn:schemas-microsoft-com:vml" Requires="v">
-                <p:oleObj spid="_x0000_s1260" name="Worksheet" r:id="rId3" imgW="5074938" imgH="7505625" progId="Excel.Sheet.12">
+                <p:oleObj spid="_x0000_s1266" name="Worksheet" r:id="rId3" imgW="5074938" imgH="7505625" progId="Excel.Sheet.12">
                   <p:embed/>
                 </p:oleObj>
               </mc:Choice>
@@ -5601,7 +5593,7 @@
           <a:graphicData uri="http://schemas.openxmlformats.org/presentationml/2006/ole">
             <mc:AlternateContent xmlns:mc="http://schemas.openxmlformats.org/markup-compatibility/2006">
               <mc:Choice xmlns:v="urn:schemas-microsoft-com:vml" Requires="v">
-                <p:oleObj spid="_x0000_s1261" name="Worksheet" r:id="rId5" imgW="5074938" imgH="7688633" progId="Excel.Sheet.12">
+                <p:oleObj spid="_x0000_s1267" name="Worksheet" r:id="rId5" imgW="5074938" imgH="7688633" progId="Excel.Sheet.12">
                   <p:embed/>
                 </p:oleObj>
               </mc:Choice>
@@ -5685,11 +5677,7 @@
           <a:p>
             <a:r>
               <a:rPr lang="en-US" sz="4000" dirty="0" smtClean="0"/>
-              <a:t>Second Business </a:t>
-            </a:r>
-            <a:r>
-              <a:rPr lang="en-US" sz="4000" dirty="0" smtClean="0"/>
-              <a:t>Question Thought Process</a:t>
+              <a:t>Second Business Question Thought Process</a:t>
             </a:r>
             <a:endParaRPr lang="en-US" sz="4000" dirty="0"/>
           </a:p>
@@ -5708,7 +5696,7 @@
         <p:spPr/>
         <p:txBody>
           <a:bodyPr>
-            <a:normAutofit fontScale="77500" lnSpcReduction="20000"/>
+            <a:normAutofit fontScale="70000" lnSpcReduction="20000"/>
           </a:bodyPr>
           <a:lstStyle/>
           <a:p>
@@ -5727,13 +5715,8 @@
           <a:p>
             <a:r>
               <a:rPr lang="en-US" dirty="0" smtClean="0"/>
-              <a:t>Interpretation</a:t>
-            </a:r>
-            <a:r>
-              <a:rPr lang="en-US" dirty="0" smtClean="0"/>
-              <a:t>:</a:t>
-            </a:r>
-            <a:endParaRPr lang="en-US" dirty="0" smtClean="0"/>
+              <a:t>Interpretation:</a:t>
+            </a:r>
           </a:p>
           <a:p>
             <a:pPr lvl="1"/>
@@ -5752,8 +5735,20 @@
             <a:pPr lvl="1"/>
             <a:r>
               <a:rPr lang="en-US" dirty="0" smtClean="0"/>
-              <a:t>The GPI is the ratio of female enrollment to male enrollment within a given level of education.  The dataset provides a GPI for primary, secondary, primary + secondary, and tertiary education</a:t>
-            </a:r>
+              <a:t>The GPI is the ratio of female enrollment to male enrollment within a given level of education.  The dataset provides a GPI for primary, secondary, primary + secondary, and tertiary </a:t>
+            </a:r>
+            <a:r>
+              <a:rPr lang="en-US" dirty="0" smtClean="0"/>
+              <a:t>education</a:t>
+            </a:r>
+          </a:p>
+          <a:p>
+            <a:pPr lvl="1"/>
+            <a:r>
+              <a:rPr lang="en-US" dirty="0" smtClean="0"/>
+              <a:t>Confounding variable with this metric is when the number of males decreases</a:t>
+            </a:r>
+            <a:endParaRPr lang="en-US" dirty="0" smtClean="0"/>
           </a:p>
           <a:p>
             <a:pPr lvl="1"/>
@@ -6120,11 +6115,7 @@
           <a:p>
             <a:r>
               <a:rPr lang="en-US" dirty="0" smtClean="0"/>
-              <a:t>Third Business </a:t>
-            </a:r>
-            <a:r>
-              <a:rPr lang="en-US" dirty="0" smtClean="0"/>
-              <a:t>Question Thought Process</a:t>
+              <a:t>Third Business Question Thought Process</a:t>
             </a:r>
             <a:endParaRPr lang="en-US" dirty="0"/>
           </a:p>
@@ -6236,11 +6227,7 @@
           <a:p>
             <a:r>
               <a:rPr lang="en-US" dirty="0" smtClean="0"/>
-              <a:t>Fourth Business </a:t>
-            </a:r>
-            <a:r>
-              <a:rPr lang="en-US" dirty="0" smtClean="0"/>
-              <a:t>Question Thought Process</a:t>
+              <a:t>Fourth Business Question Thought Process</a:t>
             </a:r>
             <a:endParaRPr lang="en-US" dirty="0"/>
           </a:p>
@@ -6286,11 +6273,7 @@
           <a:p>
             <a:r>
               <a:rPr lang="en-US" dirty="0" smtClean="0"/>
-              <a:t>Interpretation</a:t>
-            </a:r>
-            <a:r>
-              <a:rPr lang="en-US" dirty="0" smtClean="0"/>
-              <a:t>:</a:t>
+              <a:t>Interpretation:</a:t>
             </a:r>
             <a:endParaRPr lang="en-US" dirty="0"/>
           </a:p>
@@ -6677,7 +6660,7 @@
           <a:graphicData uri="http://schemas.openxmlformats.org/presentationml/2006/ole">
             <mc:AlternateContent xmlns:mc="http://schemas.openxmlformats.org/markup-compatibility/2006">
               <mc:Choice xmlns:v="urn:schemas-microsoft-com:vml" Requires="v">
-                <p:oleObj spid="_x0000_s2165" name="Worksheet" r:id="rId5" imgW="3619371" imgH="1653401" progId="Excel.Sheet.12">
+                <p:oleObj spid="_x0000_s2168" name="Worksheet" r:id="rId5" imgW="3619371" imgH="1653401" progId="Excel.Sheet.12">
                   <p:embed/>
                 </p:oleObj>
               </mc:Choice>
@@ -7379,19 +7362,7 @@
           <a:p>
             <a:r>
               <a:rPr lang="en-US" dirty="0" smtClean="0"/>
-              <a:t>NOTE:  See the </a:t>
-            </a:r>
-            <a:r>
-              <a:rPr lang="en-US" dirty="0" smtClean="0"/>
-              <a:t>appendix</a:t>
-            </a:r>
-            <a:r>
-              <a:rPr lang="en-US" dirty="0" smtClean="0"/>
-              <a:t> </a:t>
-            </a:r>
-            <a:r>
-              <a:rPr lang="en-US" dirty="0" smtClean="0"/>
-              <a:t>for scatter plots for the other two education groups</a:t>
+              <a:t>NOTE:  See the appendix for scatter plots for the other two education groups</a:t>
             </a:r>
             <a:endParaRPr lang="en-US" dirty="0"/>
           </a:p>
@@ -7936,11 +7907,7 @@
           <a:p>
             <a:r>
               <a:rPr lang="en-US" dirty="0" smtClean="0"/>
-              <a:t>Considered the founding of Revature back in </a:t>
-            </a:r>
-            <a:r>
-              <a:rPr lang="en-US" dirty="0" smtClean="0"/>
-              <a:t>2003 (source: “Glassdoor”)</a:t>
+              <a:t>Considered the founding of Revature back in 2003 (source: “Glassdoor”)</a:t>
             </a:r>
           </a:p>
           <a:p>
@@ -7948,7 +7915,6 @@
               <a:rPr lang="en-US" dirty="0" smtClean="0"/>
               <a:t>Assume that Revature was founded in the United States in the year 2003</a:t>
             </a:r>
-            <a:endParaRPr lang="en-US" dirty="0" smtClean="0"/>
           </a:p>
           <a:p>
             <a:r>
@@ -7968,11 +7934,7 @@
             </a:pPr>
             <a:r>
               <a:rPr lang="en-US" dirty="0"/>
-              <a:t>The time in days required to do start up </a:t>
-            </a:r>
-            <a:r>
-              <a:rPr lang="en-US" dirty="0"/>
-              <a:t>a</a:t>
+              <a:t>The time in days required to do start up a</a:t>
             </a:r>
             <a:r>
               <a:rPr lang="en-US" dirty="0" smtClean="0"/>
@@ -7990,19 +7952,11 @@
             </a:pPr>
             <a:r>
               <a:rPr lang="en-US" dirty="0"/>
-              <a:t>The number of procedures necessary to register </a:t>
-            </a:r>
-            <a:r>
-              <a:rPr lang="en-US" dirty="0"/>
-              <a:t>a</a:t>
+              <a:t>The number of procedures necessary to register a</a:t>
             </a:r>
             <a:r>
               <a:rPr lang="en-US" dirty="0" smtClean="0"/>
-              <a:t> </a:t>
-            </a:r>
-            <a:r>
-              <a:rPr lang="en-US" dirty="0" smtClean="0"/>
-              <a:t>business</a:t>
+              <a:t> business</a:t>
             </a:r>
           </a:p>
           <a:p>
@@ -8039,15 +7993,7 @@
                   <a:srgbClr val="FF0000"/>
                 </a:solidFill>
               </a:rPr>
-              <a:t>evature would have encountered the least amount of red </a:t>
-            </a:r>
-            <a:r>
-              <a:rPr lang="en-US" dirty="0" smtClean="0">
-                <a:solidFill>
-                  <a:srgbClr val="FF0000"/>
-                </a:solidFill>
-              </a:rPr>
-              <a:t>tape</a:t>
+              <a:t>evature would have encountered the least amount of red tape</a:t>
             </a:r>
           </a:p>
           <a:p>
@@ -8060,11 +8006,6 @@
               </a:rPr>
               <a:t>Follow-up:  Compare the optimal choice to choosing the United States     </a:t>
             </a:r>
-            <a:endParaRPr lang="en-US" dirty="0" smtClean="0">
-              <a:solidFill>
-                <a:srgbClr val="FF0000"/>
-              </a:solidFill>
-            </a:endParaRPr>
           </a:p>
           <a:p>
             <a:pPr lvl="1"/>
@@ -8175,47 +8116,7 @@
                   <a:srgbClr val="FF0000"/>
                 </a:solidFill>
               </a:rPr>
-              <a:t>Based on these </a:t>
-            </a:r>
-            <a:r>
-              <a:rPr lang="en-US" sz="2400" dirty="0" smtClean="0">
-                <a:solidFill>
-                  <a:srgbClr val="FF0000"/>
-                </a:solidFill>
-              </a:rPr>
-              <a:t>metrics </a:t>
-            </a:r>
-            <a:r>
-              <a:rPr lang="en-US" sz="2400" dirty="0" smtClean="0">
-                <a:solidFill>
-                  <a:srgbClr val="FF0000"/>
-                </a:solidFill>
-              </a:rPr>
-              <a:t>alone, the optimal country for the founding of Revature would have been Australia with a start-up time of only 3 days and </a:t>
-            </a:r>
-            <a:r>
-              <a:rPr lang="en-US" sz="2400" dirty="0" smtClean="0">
-                <a:solidFill>
-                  <a:srgbClr val="FF0000"/>
-                </a:solidFill>
-              </a:rPr>
-              <a:t>only 3</a:t>
-            </a:r>
-            <a:r>
-              <a:rPr lang="en-US" sz="2400" dirty="0" smtClean="0">
-                <a:solidFill>
-                  <a:srgbClr val="FF0000"/>
-                </a:solidFill>
-              </a:rPr>
-              <a:t> </a:t>
-            </a:r>
-            <a:r>
-              <a:rPr lang="en-US" sz="2400" dirty="0" smtClean="0">
-                <a:solidFill>
-                  <a:srgbClr val="FF0000"/>
-                </a:solidFill>
-              </a:rPr>
-              <a:t>required registration procedures</a:t>
+              <a:t>Based on these metrics alone, the optimal country for the founding of Revature would have been Australia with a start-up time of only 3 days and only 3 required registration procedures</a:t>
             </a:r>
           </a:p>
           <a:p>
@@ -8228,23 +8129,14 @@
             <a:pPr lvl="1"/>
             <a:r>
               <a:rPr lang="en-US" sz="2000" dirty="0" smtClean="0"/>
-              <a:t>Startup in the U.S. was 3 </a:t>
-            </a:r>
+              <a:t>Startup in the U.S. was 3 days longer </a:t>
+            </a:r>
+          </a:p>
+          <a:p>
+            <a:pPr lvl="1"/>
             <a:r>
               <a:rPr lang="en-US" sz="2000" dirty="0" smtClean="0"/>
-              <a:t>days longer </a:t>
-            </a:r>
-            <a:endParaRPr lang="en-US" sz="2000" dirty="0" smtClean="0"/>
-          </a:p>
-          <a:p>
-            <a:pPr lvl="1"/>
-            <a:r>
-              <a:rPr lang="en-US" sz="2000" dirty="0" smtClean="0"/>
-              <a:t>The U.S. had 3 more </a:t>
-            </a:r>
-            <a:r>
-              <a:rPr lang="en-US" sz="2000" dirty="0" smtClean="0"/>
-              <a:t>registration procedures</a:t>
+              <a:t>The U.S. had 3 more registration procedures</a:t>
             </a:r>
             <a:endParaRPr lang="en-US" sz="2000" dirty="0"/>
           </a:p>

</xml_diff>